<commit_message>
list view and ppt edit
</commit_message>
<xml_diff>
--- a/finalproject/team1/Macromarketdiscovery/debriefingppt/Team1_Macromarketdiscovery_Dinesh_Presentation.pptx
+++ b/finalproject/team1/Macromarketdiscovery/debriefingppt/Team1_Macromarketdiscovery_Dinesh_Presentation.pptx
@@ -4,16 +4,15 @@
   <p:sldMasterIdLst>
     <p:sldMasterId id="2147483648" r:id="rId1"/>
   </p:sldMasterIdLst>
+  <p:notesMasterIdLst>
+    <p:notesMasterId r:id="rId7"/>
+  </p:notesMasterIdLst>
   <p:sldIdLst>
     <p:sldId id="256" r:id="rId2"/>
-    <p:sldId id="257" r:id="rId3"/>
+    <p:sldId id="265" r:id="rId3"/>
     <p:sldId id="260" r:id="rId4"/>
     <p:sldId id="258" r:id="rId5"/>
-    <p:sldId id="259" r:id="rId6"/>
-    <p:sldId id="263" r:id="rId7"/>
-    <p:sldId id="261" r:id="rId8"/>
-    <p:sldId id="262" r:id="rId9"/>
-    <p:sldId id="264" r:id="rId10"/>
+    <p:sldId id="264" r:id="rId6"/>
   </p:sldIdLst>
   <p:sldSz cx="9144000" cy="6858000" type="screen4x3"/>
   <p:notesSz cx="6858000" cy="9144000"/>
@@ -115,6 +114,477 @@
 </p:presentation>
 </file>
 
+<file path=ppt/notesMasters/notesMaster1.xml><?xml version="1.0" encoding="utf-8"?>
+<p:notesMaster xmlns:a="http://schemas.openxmlformats.org/drawingml/2006/main" xmlns:r="http://schemas.openxmlformats.org/officeDocument/2006/relationships" xmlns:p="http://schemas.openxmlformats.org/presentationml/2006/main">
+  <p:cSld>
+    <p:bg>
+      <p:bgRef idx="1001">
+        <a:schemeClr val="bg1"/>
+      </p:bgRef>
+    </p:bg>
+    <p:spTree>
+      <p:nvGrpSpPr>
+        <p:cNvPr id="1" name=""/>
+        <p:cNvGrpSpPr/>
+        <p:nvPr/>
+      </p:nvGrpSpPr>
+      <p:grpSpPr>
+        <a:xfrm>
+          <a:off x="0" y="0"/>
+          <a:ext cx="0" cy="0"/>
+          <a:chOff x="0" y="0"/>
+          <a:chExt cx="0" cy="0"/>
+        </a:xfrm>
+      </p:grpSpPr>
+      <p:sp>
+        <p:nvSpPr>
+          <p:cNvPr id="2" name="Header Placeholder 1"/>
+          <p:cNvSpPr>
+            <a:spLocks noGrp="1"/>
+          </p:cNvSpPr>
+          <p:nvPr>
+            <p:ph type="hdr" sz="quarter"/>
+          </p:nvPr>
+        </p:nvSpPr>
+        <p:spPr>
+          <a:xfrm>
+            <a:off x="0" y="0"/>
+            <a:ext cx="2971800" cy="457200"/>
+          </a:xfrm>
+          <a:prstGeom prst="rect">
+            <a:avLst/>
+          </a:prstGeom>
+        </p:spPr>
+        <p:txBody>
+          <a:bodyPr vert="horz" lIns="91440" tIns="45720" rIns="91440" bIns="45720" rtlCol="0"/>
+          <a:lstStyle>
+            <a:lvl1pPr algn="l">
+              <a:defRPr sz="1200"/>
+            </a:lvl1pPr>
+          </a:lstStyle>
+          <a:p>
+            <a:endParaRPr lang="en-US"/>
+          </a:p>
+        </p:txBody>
+      </p:sp>
+      <p:sp>
+        <p:nvSpPr>
+          <p:cNvPr id="3" name="Date Placeholder 2"/>
+          <p:cNvSpPr>
+            <a:spLocks noGrp="1"/>
+          </p:cNvSpPr>
+          <p:nvPr>
+            <p:ph type="dt" idx="1"/>
+          </p:nvPr>
+        </p:nvSpPr>
+        <p:spPr>
+          <a:xfrm>
+            <a:off x="3884613" y="0"/>
+            <a:ext cx="2971800" cy="457200"/>
+          </a:xfrm>
+          <a:prstGeom prst="rect">
+            <a:avLst/>
+          </a:prstGeom>
+        </p:spPr>
+        <p:txBody>
+          <a:bodyPr vert="horz" lIns="91440" tIns="45720" rIns="91440" bIns="45720" rtlCol="0"/>
+          <a:lstStyle>
+            <a:lvl1pPr algn="r">
+              <a:defRPr sz="1200"/>
+            </a:lvl1pPr>
+          </a:lstStyle>
+          <a:p>
+            <a:fld id="{CB4541E1-C069-44AC-AF48-079FC246C75C}" type="datetimeFigureOut">
+              <a:rPr lang="en-US" smtClean="0"/>
+              <a:pPr/>
+              <a:t>16/09/2019</a:t>
+            </a:fld>
+            <a:endParaRPr lang="en-US"/>
+          </a:p>
+        </p:txBody>
+      </p:sp>
+      <p:sp>
+        <p:nvSpPr>
+          <p:cNvPr id="4" name="Slide Image Placeholder 3"/>
+          <p:cNvSpPr>
+            <a:spLocks noGrp="1" noRot="1" noChangeAspect="1"/>
+          </p:cNvSpPr>
+          <p:nvPr>
+            <p:ph type="sldImg" idx="2"/>
+          </p:nvPr>
+        </p:nvSpPr>
+        <p:spPr>
+          <a:xfrm>
+            <a:off x="1143000" y="685800"/>
+            <a:ext cx="4572000" cy="3429000"/>
+          </a:xfrm>
+          <a:prstGeom prst="rect">
+            <a:avLst/>
+          </a:prstGeom>
+          <a:noFill/>
+          <a:ln w="12700">
+            <a:solidFill>
+              <a:prstClr val="black"/>
+            </a:solidFill>
+          </a:ln>
+        </p:spPr>
+        <p:txBody>
+          <a:bodyPr vert="horz" lIns="91440" tIns="45720" rIns="91440" bIns="45720" rtlCol="0" anchor="ctr"/>
+          <a:lstStyle/>
+          <a:p>
+            <a:endParaRPr lang="en-US"/>
+          </a:p>
+        </p:txBody>
+      </p:sp>
+      <p:sp>
+        <p:nvSpPr>
+          <p:cNvPr id="5" name="Notes Placeholder 4"/>
+          <p:cNvSpPr>
+            <a:spLocks noGrp="1"/>
+          </p:cNvSpPr>
+          <p:nvPr>
+            <p:ph type="body" sz="quarter" idx="3"/>
+          </p:nvPr>
+        </p:nvSpPr>
+        <p:spPr>
+          <a:xfrm>
+            <a:off x="685800" y="4343400"/>
+            <a:ext cx="5486400" cy="4114800"/>
+          </a:xfrm>
+          <a:prstGeom prst="rect">
+            <a:avLst/>
+          </a:prstGeom>
+        </p:spPr>
+        <p:txBody>
+          <a:bodyPr vert="horz" lIns="91440" tIns="45720" rIns="91440" bIns="45720" rtlCol="0">
+            <a:normAutofit/>
+          </a:bodyPr>
+          <a:lstStyle/>
+          <a:p>
+            <a:pPr lvl="0"/>
+            <a:r>
+              <a:rPr lang="en-US" smtClean="0"/>
+              <a:t>Click to edit Master text styles</a:t>
+            </a:r>
+          </a:p>
+          <a:p>
+            <a:pPr lvl="1"/>
+            <a:r>
+              <a:rPr lang="en-US" smtClean="0"/>
+              <a:t>Second level</a:t>
+            </a:r>
+          </a:p>
+          <a:p>
+            <a:pPr lvl="2"/>
+            <a:r>
+              <a:rPr lang="en-US" smtClean="0"/>
+              <a:t>Third level</a:t>
+            </a:r>
+          </a:p>
+          <a:p>
+            <a:pPr lvl="3"/>
+            <a:r>
+              <a:rPr lang="en-US" smtClean="0"/>
+              <a:t>Fourth level</a:t>
+            </a:r>
+          </a:p>
+          <a:p>
+            <a:pPr lvl="4"/>
+            <a:r>
+              <a:rPr lang="en-US" smtClean="0"/>
+              <a:t>Fifth level</a:t>
+            </a:r>
+            <a:endParaRPr lang="en-US"/>
+          </a:p>
+        </p:txBody>
+      </p:sp>
+      <p:sp>
+        <p:nvSpPr>
+          <p:cNvPr id="6" name="Footer Placeholder 5"/>
+          <p:cNvSpPr>
+            <a:spLocks noGrp="1"/>
+          </p:cNvSpPr>
+          <p:nvPr>
+            <p:ph type="ftr" sz="quarter" idx="4"/>
+          </p:nvPr>
+        </p:nvSpPr>
+        <p:spPr>
+          <a:xfrm>
+            <a:off x="0" y="8685213"/>
+            <a:ext cx="2971800" cy="457200"/>
+          </a:xfrm>
+          <a:prstGeom prst="rect">
+            <a:avLst/>
+          </a:prstGeom>
+        </p:spPr>
+        <p:txBody>
+          <a:bodyPr vert="horz" lIns="91440" tIns="45720" rIns="91440" bIns="45720" rtlCol="0" anchor="b"/>
+          <a:lstStyle>
+            <a:lvl1pPr algn="l">
+              <a:defRPr sz="1200"/>
+            </a:lvl1pPr>
+          </a:lstStyle>
+          <a:p>
+            <a:endParaRPr lang="en-US"/>
+          </a:p>
+        </p:txBody>
+      </p:sp>
+      <p:sp>
+        <p:nvSpPr>
+          <p:cNvPr id="7" name="Slide Number Placeholder 6"/>
+          <p:cNvSpPr>
+            <a:spLocks noGrp="1"/>
+          </p:cNvSpPr>
+          <p:nvPr>
+            <p:ph type="sldNum" sz="quarter" idx="5"/>
+          </p:nvPr>
+        </p:nvSpPr>
+        <p:spPr>
+          <a:xfrm>
+            <a:off x="3884613" y="8685213"/>
+            <a:ext cx="2971800" cy="457200"/>
+          </a:xfrm>
+          <a:prstGeom prst="rect">
+            <a:avLst/>
+          </a:prstGeom>
+        </p:spPr>
+        <p:txBody>
+          <a:bodyPr vert="horz" lIns="91440" tIns="45720" rIns="91440" bIns="45720" rtlCol="0" anchor="b"/>
+          <a:lstStyle>
+            <a:lvl1pPr algn="r">
+              <a:defRPr sz="1200"/>
+            </a:lvl1pPr>
+          </a:lstStyle>
+          <a:p>
+            <a:fld id="{F71CE96E-D9AE-4D7E-8B7A-FC24F547BA27}" type="slidenum">
+              <a:rPr lang="en-US" smtClean="0"/>
+              <a:pPr/>
+              <a:t>‹#›</a:t>
+            </a:fld>
+            <a:endParaRPr lang="en-US"/>
+          </a:p>
+        </p:txBody>
+      </p:sp>
+    </p:spTree>
+  </p:cSld>
+  <p:clrMap bg1="lt1" tx1="dk1" bg2="lt2" tx2="dk2" accent1="accent1" accent2="accent2" accent3="accent3" accent4="accent4" accent5="accent5" accent6="accent6" hlink="hlink" folHlink="folHlink"/>
+  <p:notesStyle>
+    <a:lvl1pPr marL="0" algn="l" defTabSz="914400" rtl="0" eaLnBrk="1" latinLnBrk="0" hangingPunct="1">
+      <a:defRPr sz="1200" kern="1200">
+        <a:solidFill>
+          <a:schemeClr val="tx1"/>
+        </a:solidFill>
+        <a:latin typeface="+mn-lt"/>
+        <a:ea typeface="+mn-ea"/>
+        <a:cs typeface="+mn-cs"/>
+      </a:defRPr>
+    </a:lvl1pPr>
+    <a:lvl2pPr marL="457200" algn="l" defTabSz="914400" rtl="0" eaLnBrk="1" latinLnBrk="0" hangingPunct="1">
+      <a:defRPr sz="1200" kern="1200">
+        <a:solidFill>
+          <a:schemeClr val="tx1"/>
+        </a:solidFill>
+        <a:latin typeface="+mn-lt"/>
+        <a:ea typeface="+mn-ea"/>
+        <a:cs typeface="+mn-cs"/>
+      </a:defRPr>
+    </a:lvl2pPr>
+    <a:lvl3pPr marL="914400" algn="l" defTabSz="914400" rtl="0" eaLnBrk="1" latinLnBrk="0" hangingPunct="1">
+      <a:defRPr sz="1200" kern="1200">
+        <a:solidFill>
+          <a:schemeClr val="tx1"/>
+        </a:solidFill>
+        <a:latin typeface="+mn-lt"/>
+        <a:ea typeface="+mn-ea"/>
+        <a:cs typeface="+mn-cs"/>
+      </a:defRPr>
+    </a:lvl3pPr>
+    <a:lvl4pPr marL="1371600" algn="l" defTabSz="914400" rtl="0" eaLnBrk="1" latinLnBrk="0" hangingPunct="1">
+      <a:defRPr sz="1200" kern="1200">
+        <a:solidFill>
+          <a:schemeClr val="tx1"/>
+        </a:solidFill>
+        <a:latin typeface="+mn-lt"/>
+        <a:ea typeface="+mn-ea"/>
+        <a:cs typeface="+mn-cs"/>
+      </a:defRPr>
+    </a:lvl4pPr>
+    <a:lvl5pPr marL="1828800" algn="l" defTabSz="914400" rtl="0" eaLnBrk="1" latinLnBrk="0" hangingPunct="1">
+      <a:defRPr sz="1200" kern="1200">
+        <a:solidFill>
+          <a:schemeClr val="tx1"/>
+        </a:solidFill>
+        <a:latin typeface="+mn-lt"/>
+        <a:ea typeface="+mn-ea"/>
+        <a:cs typeface="+mn-cs"/>
+      </a:defRPr>
+    </a:lvl5pPr>
+    <a:lvl6pPr marL="2286000" algn="l" defTabSz="914400" rtl="0" eaLnBrk="1" latinLnBrk="0" hangingPunct="1">
+      <a:defRPr sz="1200" kern="1200">
+        <a:solidFill>
+          <a:schemeClr val="tx1"/>
+        </a:solidFill>
+        <a:latin typeface="+mn-lt"/>
+        <a:ea typeface="+mn-ea"/>
+        <a:cs typeface="+mn-cs"/>
+      </a:defRPr>
+    </a:lvl6pPr>
+    <a:lvl7pPr marL="2743200" algn="l" defTabSz="914400" rtl="0" eaLnBrk="1" latinLnBrk="0" hangingPunct="1">
+      <a:defRPr sz="1200" kern="1200">
+        <a:solidFill>
+          <a:schemeClr val="tx1"/>
+        </a:solidFill>
+        <a:latin typeface="+mn-lt"/>
+        <a:ea typeface="+mn-ea"/>
+        <a:cs typeface="+mn-cs"/>
+      </a:defRPr>
+    </a:lvl7pPr>
+    <a:lvl8pPr marL="3200400" algn="l" defTabSz="914400" rtl="0" eaLnBrk="1" latinLnBrk="0" hangingPunct="1">
+      <a:defRPr sz="1200" kern="1200">
+        <a:solidFill>
+          <a:schemeClr val="tx1"/>
+        </a:solidFill>
+        <a:latin typeface="+mn-lt"/>
+        <a:ea typeface="+mn-ea"/>
+        <a:cs typeface="+mn-cs"/>
+      </a:defRPr>
+    </a:lvl8pPr>
+    <a:lvl9pPr marL="3657600" algn="l" defTabSz="914400" rtl="0" eaLnBrk="1" latinLnBrk="0" hangingPunct="1">
+      <a:defRPr sz="1200" kern="1200">
+        <a:solidFill>
+          <a:schemeClr val="tx1"/>
+        </a:solidFill>
+        <a:latin typeface="+mn-lt"/>
+        <a:ea typeface="+mn-ea"/>
+        <a:cs typeface="+mn-cs"/>
+      </a:defRPr>
+    </a:lvl9pPr>
+  </p:notesStyle>
+</p:notesMaster>
+</file>
+
+<file path=ppt/notesSlides/notesSlide1.xml><?xml version="1.0" encoding="utf-8"?>
+<p:notes xmlns:a="http://schemas.openxmlformats.org/drawingml/2006/main" xmlns:r="http://schemas.openxmlformats.org/officeDocument/2006/relationships" xmlns:p="http://schemas.openxmlformats.org/presentationml/2006/main">
+  <p:cSld>
+    <p:spTree>
+      <p:nvGrpSpPr>
+        <p:cNvPr id="1" name=""/>
+        <p:cNvGrpSpPr/>
+        <p:nvPr/>
+      </p:nvGrpSpPr>
+      <p:grpSpPr>
+        <a:xfrm>
+          <a:off x="0" y="0"/>
+          <a:ext cx="0" cy="0"/>
+          <a:chOff x="0" y="0"/>
+          <a:chExt cx="0" cy="0"/>
+        </a:xfrm>
+      </p:grpSpPr>
+      <p:sp>
+        <p:nvSpPr>
+          <p:cNvPr id="2" name="Slide Image Placeholder 1"/>
+          <p:cNvSpPr>
+            <a:spLocks noGrp="1" noRot="1" noChangeAspect="1"/>
+          </p:cNvSpPr>
+          <p:nvPr>
+            <p:ph type="sldImg"/>
+          </p:nvPr>
+        </p:nvSpPr>
+        <p:spPr/>
+      </p:sp>
+      <p:sp>
+        <p:nvSpPr>
+          <p:cNvPr id="3" name="Notes Placeholder 2"/>
+          <p:cNvSpPr>
+            <a:spLocks noGrp="1"/>
+          </p:cNvSpPr>
+          <p:nvPr>
+            <p:ph type="body" idx="1"/>
+          </p:nvPr>
+        </p:nvSpPr>
+        <p:spPr/>
+        <p:txBody>
+          <a:bodyPr>
+            <a:normAutofit fontScale="85000" lnSpcReduction="20000"/>
+          </a:bodyPr>
+          <a:lstStyle/>
+          <a:p>
+            <a:pPr marL="0" marR="0" indent="0" algn="l" defTabSz="914400" rtl="0" eaLnBrk="1" fontAlgn="auto" latinLnBrk="0" hangingPunct="1">
+              <a:lnSpc>
+                <a:spcPct val="100000"/>
+              </a:lnSpc>
+              <a:spcBef>
+                <a:spcPts val="0"/>
+              </a:spcBef>
+              <a:spcAft>
+                <a:spcPts val="0"/>
+              </a:spcAft>
+              <a:buClrTx/>
+              <a:buSzTx/>
+              <a:buFontTx/>
+              <a:buNone/>
+              <a:tabLst/>
+              <a:defRPr/>
+            </a:pPr>
+            <a:endParaRPr lang="en-US" sz="1800" dirty="0" smtClean="0"/>
+          </a:p>
+          <a:p>
+            <a:pPr marL="0" marR="0" indent="0" algn="l" defTabSz="914400" rtl="0" eaLnBrk="1" fontAlgn="auto" latinLnBrk="0" hangingPunct="1">
+              <a:lnSpc>
+                <a:spcPct val="100000"/>
+              </a:lnSpc>
+              <a:spcBef>
+                <a:spcPts val="0"/>
+              </a:spcBef>
+              <a:spcAft>
+                <a:spcPts val="0"/>
+              </a:spcAft>
+              <a:buClrTx/>
+              <a:buSzTx/>
+              <a:buFontTx/>
+              <a:buNone/>
+              <a:tabLst/>
+              <a:defRPr/>
+            </a:pPr>
+            <a:endParaRPr lang="en-US" sz="1800" dirty="0" smtClean="0"/>
+          </a:p>
+          <a:p>
+            <a:endParaRPr lang="en-US" dirty="0"/>
+          </a:p>
+        </p:txBody>
+      </p:sp>
+      <p:sp>
+        <p:nvSpPr>
+          <p:cNvPr id="4" name="Slide Number Placeholder 3"/>
+          <p:cNvSpPr>
+            <a:spLocks noGrp="1"/>
+          </p:cNvSpPr>
+          <p:nvPr>
+            <p:ph type="sldNum" sz="quarter" idx="10"/>
+          </p:nvPr>
+        </p:nvSpPr>
+        <p:spPr/>
+        <p:txBody>
+          <a:bodyPr/>
+          <a:lstStyle/>
+          <a:p>
+            <a:fld id="{F71CE96E-D9AE-4D7E-8B7A-FC24F547BA27}" type="slidenum">
+              <a:rPr lang="en-US" smtClean="0"/>
+              <a:pPr/>
+              <a:t>3</a:t>
+            </a:fld>
+            <a:endParaRPr lang="en-US"/>
+          </a:p>
+        </p:txBody>
+      </p:sp>
+    </p:spTree>
+  </p:cSld>
+  <p:clrMapOvr>
+    <a:masterClrMapping/>
+  </p:clrMapOvr>
+</p:notes>
+</file>
+
 <file path=ppt/slideLayouts/slideLayout1.xml><?xml version="1.0" encoding="utf-8"?>
 <p:sldLayout xmlns:a="http://schemas.openxmlformats.org/drawingml/2006/main" xmlns:r="http://schemas.openxmlformats.org/officeDocument/2006/relationships" xmlns:p="http://schemas.openxmlformats.org/presentationml/2006/main" type="title" preserve="1">
   <p:cSld name="Title Slide">
@@ -297,7 +767,7 @@
             <a:fld id="{21A09630-8512-402F-BB59-098690CDBE2F}" type="datetimeFigureOut">
               <a:rPr lang="en-US" smtClean="0"/>
               <a:pPr/>
-              <a:t>11/09/2019</a:t>
+              <a:t>16/09/2019</a:t>
             </a:fld>
             <a:endParaRPr lang="en-US"/>
           </a:p>
@@ -464,7 +934,7 @@
             <a:fld id="{21A09630-8512-402F-BB59-098690CDBE2F}" type="datetimeFigureOut">
               <a:rPr lang="en-US" smtClean="0"/>
               <a:pPr/>
-              <a:t>11/09/2019</a:t>
+              <a:t>16/09/2019</a:t>
             </a:fld>
             <a:endParaRPr lang="en-US"/>
           </a:p>
@@ -641,7 +1111,7 @@
             <a:fld id="{21A09630-8512-402F-BB59-098690CDBE2F}" type="datetimeFigureOut">
               <a:rPr lang="en-US" smtClean="0"/>
               <a:pPr/>
-              <a:t>11/09/2019</a:t>
+              <a:t>16/09/2019</a:t>
             </a:fld>
             <a:endParaRPr lang="en-US"/>
           </a:p>
@@ -808,7 +1278,7 @@
             <a:fld id="{21A09630-8512-402F-BB59-098690CDBE2F}" type="datetimeFigureOut">
               <a:rPr lang="en-US" smtClean="0"/>
               <a:pPr/>
-              <a:t>11/09/2019</a:t>
+              <a:t>16/09/2019</a:t>
             </a:fld>
             <a:endParaRPr lang="en-US"/>
           </a:p>
@@ -1051,7 +1521,7 @@
             <a:fld id="{21A09630-8512-402F-BB59-098690CDBE2F}" type="datetimeFigureOut">
               <a:rPr lang="en-US" smtClean="0"/>
               <a:pPr/>
-              <a:t>11/09/2019</a:t>
+              <a:t>16/09/2019</a:t>
             </a:fld>
             <a:endParaRPr lang="en-US"/>
           </a:p>
@@ -1336,7 +1806,7 @@
             <a:fld id="{21A09630-8512-402F-BB59-098690CDBE2F}" type="datetimeFigureOut">
               <a:rPr lang="en-US" smtClean="0"/>
               <a:pPr/>
-              <a:t>11/09/2019</a:t>
+              <a:t>16/09/2019</a:t>
             </a:fld>
             <a:endParaRPr lang="en-US"/>
           </a:p>
@@ -1755,7 +2225,7 @@
             <a:fld id="{21A09630-8512-402F-BB59-098690CDBE2F}" type="datetimeFigureOut">
               <a:rPr lang="en-US" smtClean="0"/>
               <a:pPr/>
-              <a:t>11/09/2019</a:t>
+              <a:t>16/09/2019</a:t>
             </a:fld>
             <a:endParaRPr lang="en-US"/>
           </a:p>
@@ -1870,7 +2340,7 @@
             <a:fld id="{21A09630-8512-402F-BB59-098690CDBE2F}" type="datetimeFigureOut">
               <a:rPr lang="en-US" smtClean="0"/>
               <a:pPr/>
-              <a:t>11/09/2019</a:t>
+              <a:t>16/09/2019</a:t>
             </a:fld>
             <a:endParaRPr lang="en-US"/>
           </a:p>
@@ -1962,7 +2432,7 @@
             <a:fld id="{21A09630-8512-402F-BB59-098690CDBE2F}" type="datetimeFigureOut">
               <a:rPr lang="en-US" smtClean="0"/>
               <a:pPr/>
-              <a:t>11/09/2019</a:t>
+              <a:t>16/09/2019</a:t>
             </a:fld>
             <a:endParaRPr lang="en-US"/>
           </a:p>
@@ -2236,7 +2706,7 @@
             <a:fld id="{21A09630-8512-402F-BB59-098690CDBE2F}" type="datetimeFigureOut">
               <a:rPr lang="en-US" smtClean="0"/>
               <a:pPr/>
-              <a:t>11/09/2019</a:t>
+              <a:t>16/09/2019</a:t>
             </a:fld>
             <a:endParaRPr lang="en-US"/>
           </a:p>
@@ -2486,7 +2956,7 @@
             <a:fld id="{21A09630-8512-402F-BB59-098690CDBE2F}" type="datetimeFigureOut">
               <a:rPr lang="en-US" smtClean="0"/>
               <a:pPr/>
-              <a:t>11/09/2019</a:t>
+              <a:t>16/09/2019</a:t>
             </a:fld>
             <a:endParaRPr lang="en-US"/>
           </a:p>
@@ -2696,7 +3166,7 @@
             <a:fld id="{21A09630-8512-402F-BB59-098690CDBE2F}" type="datetimeFigureOut">
               <a:rPr lang="en-US" smtClean="0"/>
               <a:pPr/>
-              <a:t>11/09/2019</a:t>
+              <a:t>16/09/2019</a:t>
             </a:fld>
             <a:endParaRPr lang="en-US"/>
           </a:p>
@@ -3112,13 +3582,7 @@
               <a:rPr lang="en-US" sz="4000" dirty="0" smtClean="0">
                 <a:latin typeface="Algerian" pitchFamily="82" charset="0"/>
               </a:rPr>
-              <a:t> </a:t>
-            </a:r>
-            <a:r>
-              <a:rPr lang="en-US" sz="4000" dirty="0" smtClean="0">
-                <a:latin typeface="Algerian" pitchFamily="82" charset="0"/>
-              </a:rPr>
-              <a:t>MACRO-MARKET-DISCOVERY</a:t>
+              <a:t> MACRO-MARKET-DISCOVERY</a:t>
             </a:r>
             <a:endParaRPr lang="en-US" sz="4000" dirty="0">
               <a:latin typeface="Algerian" pitchFamily="82" charset="0"/>
@@ -3209,8 +3673,8 @@
         </p:nvSpPr>
         <p:spPr>
           <a:xfrm>
-            <a:off x="3352800" y="381000"/>
-            <a:ext cx="2590800" cy="769441"/>
+            <a:off x="3276600" y="304800"/>
+            <a:ext cx="1981201" cy="707886"/>
           </a:xfrm>
           <a:prstGeom prst="rect">
             <a:avLst/>
@@ -3224,12 +3688,12 @@
           <a:lstStyle/>
           <a:p>
             <a:r>
-              <a:rPr lang="en-US" sz="4400" dirty="0" smtClean="0">
+              <a:rPr lang="en-US" sz="4000" dirty="0" smtClean="0">
                 <a:latin typeface="Algerian" pitchFamily="82" charset="0"/>
               </a:rPr>
-              <a:t>GOALS</a:t>
-            </a:r>
-            <a:endParaRPr lang="en-US" sz="4400" dirty="0">
+              <a:t>ABOUT</a:t>
+            </a:r>
+            <a:endParaRPr lang="en-US" sz="4000" dirty="0">
               <a:latin typeface="Algerian" pitchFamily="82" charset="0"/>
             </a:endParaRPr>
           </a:p>
@@ -3237,14 +3701,14 @@
       </p:sp>
       <p:sp>
         <p:nvSpPr>
-          <p:cNvPr id="3" name="TextBox 2"/>
+          <p:cNvPr id="6" name="TextBox 5"/>
           <p:cNvSpPr txBox="1"/>
           <p:nvPr/>
         </p:nvSpPr>
         <p:spPr>
           <a:xfrm>
-            <a:off x="228600" y="1143000"/>
-            <a:ext cx="8762572" cy="4877617"/>
+            <a:off x="533400" y="1143000"/>
+            <a:ext cx="8305800" cy="5355312"/>
           </a:xfrm>
           <a:prstGeom prst="rect">
             <a:avLst/>
@@ -3257,38 +3721,117 @@
           </a:bodyPr>
           <a:lstStyle/>
           <a:p>
-            <a:pPr algn="just">
+            <a:pPr>
               <a:lnSpc>
-                <a:spcPct val="200000"/>
+                <a:spcPct val="150000"/>
               </a:lnSpc>
               <a:buFont typeface="Wingdings" pitchFamily="2" charset="2"/>
               <a:buChar char="Ø"/>
             </a:pPr>
             <a:r>
-              <a:rPr lang="en-US" sz="2800" dirty="0" smtClean="0"/>
-              <a:t>The main goal is to understand problems faced by the unorganized business sector.</a:t>
-            </a:r>
-          </a:p>
-          <a:p>
-            <a:pPr algn="just">
+              <a:rPr lang="en-US" sz="2400" dirty="0" smtClean="0"/>
+              <a:t>“</a:t>
+            </a:r>
+            <a:r>
+              <a:rPr lang="en-US" sz="2400" dirty="0" smtClean="0"/>
+              <a:t>L</a:t>
+            </a:r>
+            <a:r>
+              <a:rPr lang="en-US" sz="2400" dirty="0" smtClean="0"/>
+              <a:t>OCO” company is in the business of providing shared </a:t>
+            </a:r>
+            <a:r>
+              <a:rPr lang="en-US" sz="2400" dirty="0" err="1" smtClean="0"/>
+              <a:t>accomodation</a:t>
+            </a:r>
+            <a:r>
+              <a:rPr lang="en-US" sz="2400" dirty="0" smtClean="0"/>
+              <a:t> .</a:t>
+            </a:r>
+          </a:p>
+          <a:p>
+            <a:pPr>
               <a:lnSpc>
-                <a:spcPct val="200000"/>
+                <a:spcPct val="150000"/>
               </a:lnSpc>
               <a:buFont typeface="Wingdings" pitchFamily="2" charset="2"/>
               <a:buChar char="Ø"/>
             </a:pPr>
             <a:r>
-              <a:rPr lang="en-US" sz="2800" dirty="0" smtClean="0"/>
-              <a:t>Understanding the problem and organizing the  unorganized business sector by fixing their employment terms and assuring them their employment.</a:t>
-            </a:r>
-          </a:p>
-          <a:p>
-            <a:pPr algn="just">
+              <a:rPr lang="en-US" sz="2400" dirty="0" smtClean="0"/>
+              <a:t>“Guess-</a:t>
+            </a:r>
+            <a:r>
+              <a:rPr lang="en-US" sz="2400" dirty="0" err="1" smtClean="0"/>
+              <a:t>gini</a:t>
+            </a:r>
+            <a:r>
+              <a:rPr lang="en-US" sz="2400" dirty="0" smtClean="0"/>
+              <a:t>”  is a platform for shared rental business.</a:t>
+            </a:r>
+          </a:p>
+          <a:p>
+            <a:pPr>
               <a:lnSpc>
-                <a:spcPct val="200000"/>
+                <a:spcPct val="150000"/>
+              </a:lnSpc>
+              <a:buFont typeface="Wingdings" pitchFamily="2" charset="2"/>
+              <a:buChar char="Ø"/>
+            </a:pPr>
+            <a:r>
+              <a:rPr lang="en-US" sz="2400" dirty="0" smtClean="0"/>
+              <a:t>Their properties are gated communities with ultra model infrastructure amenities</a:t>
+            </a:r>
+          </a:p>
+          <a:p>
+            <a:pPr>
+              <a:lnSpc>
+                <a:spcPct val="150000"/>
+              </a:lnSpc>
+              <a:buFont typeface="Wingdings" pitchFamily="2" charset="2"/>
+              <a:buChar char="Ø"/>
+            </a:pPr>
+            <a:r>
+              <a:rPr lang="en-US" sz="2400" dirty="0" smtClean="0"/>
+              <a:t>The targeted  tenants are of age limit 18-35 years. (single working </a:t>
+            </a:r>
+            <a:r>
+              <a:rPr lang="en-US" sz="2400" dirty="0" err="1" smtClean="0"/>
+              <a:t>proffesional</a:t>
+            </a:r>
+            <a:r>
+              <a:rPr lang="en-US" sz="2400" dirty="0" smtClean="0"/>
+              <a:t>, students,</a:t>
+            </a:r>
+          </a:p>
+          <a:p>
+            <a:pPr>
+              <a:lnSpc>
+                <a:spcPct val="150000"/>
               </a:lnSpc>
             </a:pPr>
+            <a:r>
+              <a:rPr lang="en-US" sz="2400" dirty="0" smtClean="0"/>
+              <a:t>Single parents)</a:t>
+            </a:r>
+          </a:p>
+          <a:p>
+            <a:pPr>
+              <a:lnSpc>
+                <a:spcPct val="150000"/>
+              </a:lnSpc>
+              <a:buFont typeface="Wingdings" pitchFamily="2" charset="2"/>
+              <a:buChar char="Ø"/>
+            </a:pPr>
             <a:endParaRPr lang="en-US" dirty="0" smtClean="0"/>
+          </a:p>
+          <a:p>
+            <a:pPr>
+              <a:lnSpc>
+                <a:spcPct val="150000"/>
+              </a:lnSpc>
+            </a:pPr>
+            <a:endParaRPr lang="en-US" dirty="0"/>
           </a:p>
         </p:txBody>
       </p:sp>
@@ -3325,8 +3868,8 @@
         </p:nvSpPr>
         <p:spPr>
           <a:xfrm>
-            <a:off x="304800" y="1143000"/>
-            <a:ext cx="8534400" cy="4401205"/>
+            <a:off x="228600" y="1143000"/>
+            <a:ext cx="8763000" cy="7402026"/>
           </a:xfrm>
           <a:prstGeom prst="rect">
             <a:avLst/>
@@ -3337,6 +3880,120 @@
             <a:spAutoFit/>
           </a:bodyPr>
           <a:lstStyle/>
+          <a:p>
+            <a:pPr>
+              <a:lnSpc>
+                <a:spcPct val="150000"/>
+              </a:lnSpc>
+              <a:buFont typeface="Wingdings" pitchFamily="2" charset="2"/>
+              <a:buChar char="Ø"/>
+            </a:pPr>
+            <a:r>
+              <a:rPr lang="en-US" sz="2800" dirty="0" smtClean="0"/>
+              <a:t>To provide easy access to basic necessity of the tenants.</a:t>
+            </a:r>
+          </a:p>
+          <a:p>
+            <a:pPr>
+              <a:lnSpc>
+                <a:spcPct val="150000"/>
+              </a:lnSpc>
+              <a:buFont typeface="Wingdings" pitchFamily="2" charset="2"/>
+              <a:buChar char="Ø"/>
+            </a:pPr>
+            <a:r>
+              <a:rPr lang="en-US" sz="2800" dirty="0" smtClean="0"/>
+              <a:t>To help tenants satisfy their major needs or fulfillments.</a:t>
+            </a:r>
+          </a:p>
+          <a:p>
+            <a:pPr>
+              <a:lnSpc>
+                <a:spcPct val="150000"/>
+              </a:lnSpc>
+              <a:buFont typeface="Wingdings" pitchFamily="2" charset="2"/>
+              <a:buChar char="Ø"/>
+            </a:pPr>
+            <a:r>
+              <a:rPr lang="en-US" sz="2800" dirty="0" smtClean="0"/>
+              <a:t>To avoid </a:t>
+            </a:r>
+            <a:r>
+              <a:rPr lang="en-US" sz="2800" dirty="0" err="1" smtClean="0"/>
+              <a:t>enemity</a:t>
+            </a:r>
+            <a:r>
+              <a:rPr lang="en-US" sz="2800" dirty="0" smtClean="0"/>
+              <a:t> with neighborhood.</a:t>
+            </a:r>
+          </a:p>
+          <a:p>
+            <a:pPr>
+              <a:lnSpc>
+                <a:spcPct val="150000"/>
+              </a:lnSpc>
+              <a:buFont typeface="Wingdings" pitchFamily="2" charset="2"/>
+              <a:buChar char="Ø"/>
+            </a:pPr>
+            <a:r>
+              <a:rPr lang="en-US" sz="2800" dirty="0" smtClean="0"/>
+              <a:t>Creating harmony among our tenants and local business.</a:t>
+            </a:r>
+          </a:p>
+          <a:p>
+            <a:pPr>
+              <a:lnSpc>
+                <a:spcPct val="150000"/>
+              </a:lnSpc>
+              <a:buFont typeface="Wingdings" pitchFamily="2" charset="2"/>
+              <a:buChar char="Ø"/>
+            </a:pPr>
+            <a:r>
+              <a:rPr lang="en-US" sz="2800" dirty="0" smtClean="0"/>
+              <a:t>Enable transactions on our platform.</a:t>
+            </a:r>
+          </a:p>
+          <a:p>
+            <a:pPr>
+              <a:lnSpc>
+                <a:spcPct val="150000"/>
+              </a:lnSpc>
+              <a:buFont typeface="Wingdings" pitchFamily="2" charset="2"/>
+              <a:buChar char="Ø"/>
+            </a:pPr>
+            <a:r>
+              <a:rPr lang="en-US" sz="2800" dirty="0" smtClean="0"/>
+              <a:t>To increase satisfaction of consumer base.</a:t>
+            </a:r>
+          </a:p>
+          <a:p>
+            <a:pPr>
+              <a:lnSpc>
+                <a:spcPct val="150000"/>
+              </a:lnSpc>
+              <a:buFont typeface="Wingdings" pitchFamily="2" charset="2"/>
+              <a:buChar char="Ø"/>
+            </a:pPr>
+            <a:endParaRPr lang="en-US" sz="2800" dirty="0" smtClean="0"/>
+          </a:p>
+          <a:p>
+            <a:pPr>
+              <a:lnSpc>
+                <a:spcPct val="150000"/>
+              </a:lnSpc>
+              <a:buFont typeface="Wingdings" pitchFamily="2" charset="2"/>
+              <a:buChar char="Ø"/>
+            </a:pPr>
+            <a:endParaRPr lang="en-US" sz="2800" dirty="0" smtClean="0"/>
+          </a:p>
+          <a:p>
+            <a:pPr>
+              <a:lnSpc>
+                <a:spcPct val="150000"/>
+              </a:lnSpc>
+            </a:pPr>
+            <a:endParaRPr lang="en-US" dirty="0" smtClean="0"/>
+          </a:p>
           <a:p>
             <a:pPr algn="just">
               <a:lnSpc>
@@ -3345,23 +4002,7 @@
               <a:buFont typeface="Wingdings" pitchFamily="2" charset="2"/>
               <a:buChar char="Ø"/>
             </a:pPr>
-            <a:r>
-              <a:rPr lang="en-US" sz="2800" dirty="0" smtClean="0"/>
-              <a:t>To help the organization to achieve increased efficiency, productivity and profitability.</a:t>
-            </a:r>
-          </a:p>
-          <a:p>
-            <a:pPr algn="just">
-              <a:lnSpc>
-                <a:spcPct val="200000"/>
-              </a:lnSpc>
-              <a:buFont typeface="Wingdings" pitchFamily="2" charset="2"/>
-              <a:buChar char="Ø"/>
-            </a:pPr>
-            <a:r>
-              <a:rPr lang="en-US" sz="2800" dirty="0" smtClean="0"/>
-              <a:t>To help customer, identify the near by service providers in their locality and  hence save their time and money</a:t>
-            </a:r>
+            <a:endParaRPr lang="en-US" sz="2800" dirty="0" smtClean="0"/>
           </a:p>
           <a:p>
             <a:pPr algn="just">
@@ -3439,7 +4080,7 @@
         </p:nvSpPr>
         <p:spPr>
           <a:xfrm>
-            <a:off x="2514600" y="228600"/>
+            <a:off x="2514600" y="0"/>
             <a:ext cx="4421003" cy="707886"/>
           </a:xfrm>
           <a:prstGeom prst="rect">
@@ -3473,8 +4114,8 @@
         </p:nvSpPr>
         <p:spPr>
           <a:xfrm>
-            <a:off x="304800" y="990600"/>
-            <a:ext cx="8686800" cy="4930581"/>
+            <a:off x="304800" y="685800"/>
+            <a:ext cx="8686800" cy="6740307"/>
           </a:xfrm>
           <a:prstGeom prst="rect">
             <a:avLst/>
@@ -3496,7 +4137,23 @@
             </a:pPr>
             <a:r>
               <a:rPr lang="en-US" sz="2800" dirty="0" smtClean="0"/>
-              <a:t>Opportunities for both organization as well as customers.</a:t>
+              <a:t>Opportunity for the </a:t>
+            </a:r>
+            <a:r>
+              <a:rPr lang="en-US" sz="2800" dirty="0" smtClean="0"/>
+              <a:t>tenants</a:t>
+            </a:r>
+            <a:r>
+              <a:rPr lang="en-US" sz="2800" dirty="0" smtClean="0"/>
+              <a:t> to get </a:t>
+            </a:r>
+            <a:r>
+              <a:rPr lang="en-US" sz="2800" dirty="0" smtClean="0"/>
+              <a:t>rewarded</a:t>
+            </a:r>
+            <a:r>
+              <a:rPr lang="en-US" sz="2800" dirty="0" smtClean="0"/>
+              <a:t> for his/her discovery of some new marketing facility.</a:t>
             </a:r>
           </a:p>
           <a:p>
@@ -3509,7 +4166,46 @@
             </a:pPr>
             <a:r>
               <a:rPr lang="en-US" sz="2800" dirty="0" smtClean="0"/>
-              <a:t>Opportunities for the unorganized business sector to showcase their marketing  skills on higher platform so that they can increase their productivity as well as profitability .</a:t>
+              <a:t>Post  and share his/her review on the experience.</a:t>
+            </a:r>
+          </a:p>
+          <a:p>
+            <a:pPr>
+              <a:lnSpc>
+                <a:spcPct val="200000"/>
+              </a:lnSpc>
+              <a:buFont typeface="Wingdings" pitchFamily="2" charset="2"/>
+              <a:buChar char="Ø"/>
+            </a:pPr>
+            <a:r>
+              <a:rPr lang="en-US" sz="2800" dirty="0" smtClean="0"/>
+              <a:t>Opportunities </a:t>
+            </a:r>
+            <a:r>
+              <a:rPr lang="en-US" sz="2800" dirty="0" smtClean="0"/>
+              <a:t>for the customers to hunt for the available </a:t>
+            </a:r>
+            <a:r>
+              <a:rPr lang="en-US" sz="2800" dirty="0" smtClean="0"/>
+              <a:t>marketing facilities . </a:t>
+            </a:r>
+            <a:endParaRPr lang="en-US" sz="2800" dirty="0" smtClean="0"/>
+          </a:p>
+          <a:p>
+            <a:pPr>
+              <a:lnSpc>
+                <a:spcPct val="200000"/>
+              </a:lnSpc>
+              <a:buFont typeface="Wingdings" pitchFamily="2" charset="2"/>
+              <a:buChar char="Ø"/>
+            </a:pPr>
+            <a:r>
+              <a:rPr lang="en-US" sz="2800" dirty="0" smtClean="0"/>
+              <a:t>To seek for offers </a:t>
+            </a:r>
+            <a:r>
+              <a:rPr lang="en-US" sz="2800" dirty="0" smtClean="0"/>
+              <a:t>that are availed by the market in the near by localities.</a:t>
             </a:r>
           </a:p>
           <a:p>
@@ -3531,760 +4227,6 @@
 </file>
 
 <file path=ppt/slides/slide5.xml><?xml version="1.0" encoding="utf-8"?>
-<p:sld xmlns:a="http://schemas.openxmlformats.org/drawingml/2006/main" xmlns:r="http://schemas.openxmlformats.org/officeDocument/2006/relationships" xmlns:p="http://schemas.openxmlformats.org/presentationml/2006/main">
-  <p:cSld>
-    <p:spTree>
-      <p:nvGrpSpPr>
-        <p:cNvPr id="1" name=""/>
-        <p:cNvGrpSpPr/>
-        <p:nvPr/>
-      </p:nvGrpSpPr>
-      <p:grpSpPr>
-        <a:xfrm>
-          <a:off x="0" y="0"/>
-          <a:ext cx="0" cy="0"/>
-          <a:chOff x="0" y="0"/>
-          <a:chExt cx="0" cy="0"/>
-        </a:xfrm>
-      </p:grpSpPr>
-      <p:sp>
-        <p:nvSpPr>
-          <p:cNvPr id="2" name="Rectangle 1"/>
-          <p:cNvSpPr/>
-          <p:nvPr/>
-        </p:nvSpPr>
-        <p:spPr>
-          <a:xfrm>
-            <a:off x="152400" y="1143000"/>
-            <a:ext cx="8763000" cy="4401205"/>
-          </a:xfrm>
-          <a:prstGeom prst="rect">
-            <a:avLst/>
-          </a:prstGeom>
-        </p:spPr>
-        <p:txBody>
-          <a:bodyPr wrap="square">
-            <a:spAutoFit/>
-          </a:bodyPr>
-          <a:lstStyle/>
-          <a:p>
-            <a:pPr>
-              <a:lnSpc>
-                <a:spcPct val="200000"/>
-              </a:lnSpc>
-              <a:buFont typeface="Wingdings" pitchFamily="2" charset="2"/>
-              <a:buChar char="Ø"/>
-            </a:pPr>
-            <a:r>
-              <a:rPr lang="en-US" sz="2800" dirty="0" smtClean="0"/>
-              <a:t>Opportunities for the customers to get well secured service and also get serviced on their doorsteps .</a:t>
-            </a:r>
-          </a:p>
-          <a:p>
-            <a:pPr>
-              <a:lnSpc>
-                <a:spcPct val="200000"/>
-              </a:lnSpc>
-              <a:buFont typeface="Wingdings" pitchFamily="2" charset="2"/>
-              <a:buChar char="Ø"/>
-            </a:pPr>
-            <a:r>
-              <a:rPr lang="en-US" sz="2800" dirty="0" smtClean="0"/>
-              <a:t>Customers will get  several services under the same sector like ….</a:t>
-            </a:r>
-          </a:p>
-          <a:p>
-            <a:pPr>
-              <a:lnSpc>
-                <a:spcPct val="200000"/>
-              </a:lnSpc>
-            </a:pPr>
-            <a:endParaRPr lang="en-US" sz="2800" dirty="0" smtClean="0"/>
-          </a:p>
-        </p:txBody>
-      </p:sp>
-      <p:sp>
-        <p:nvSpPr>
-          <p:cNvPr id="3" name="Rectangle 2"/>
-          <p:cNvSpPr/>
-          <p:nvPr/>
-        </p:nvSpPr>
-        <p:spPr>
-          <a:xfrm>
-            <a:off x="2362200" y="228600"/>
-            <a:ext cx="4419600" cy="707886"/>
-          </a:xfrm>
-          <a:prstGeom prst="rect">
-            <a:avLst/>
-          </a:prstGeom>
-        </p:spPr>
-        <p:txBody>
-          <a:bodyPr wrap="square">
-            <a:spAutoFit/>
-          </a:bodyPr>
-          <a:lstStyle/>
-          <a:p>
-            <a:r>
-              <a:rPr lang="en-US" sz="4000" dirty="0" smtClean="0">
-                <a:latin typeface="Algerian" pitchFamily="82" charset="0"/>
-              </a:rPr>
-              <a:t>OPPORTUNITIES</a:t>
-            </a:r>
-            <a:endParaRPr lang="en-US" sz="4000" dirty="0">
-              <a:latin typeface="Algerian" pitchFamily="82" charset="0"/>
-            </a:endParaRPr>
-          </a:p>
-        </p:txBody>
-      </p:sp>
-    </p:spTree>
-  </p:cSld>
-  <p:clrMapOvr>
-    <a:masterClrMapping/>
-  </p:clrMapOvr>
-</p:sld>
-</file>
-
-<file path=ppt/slides/slide6.xml><?xml version="1.0" encoding="utf-8"?>
-<p:sld xmlns:a="http://schemas.openxmlformats.org/drawingml/2006/main" xmlns:r="http://schemas.openxmlformats.org/officeDocument/2006/relationships" xmlns:p="http://schemas.openxmlformats.org/presentationml/2006/main">
-  <p:cSld>
-    <p:spTree>
-      <p:nvGrpSpPr>
-        <p:cNvPr id="1" name=""/>
-        <p:cNvGrpSpPr/>
-        <p:nvPr/>
-      </p:nvGrpSpPr>
-      <p:grpSpPr>
-        <a:xfrm>
-          <a:off x="0" y="0"/>
-          <a:ext cx="0" cy="0"/>
-          <a:chOff x="0" y="0"/>
-          <a:chExt cx="0" cy="0"/>
-        </a:xfrm>
-      </p:grpSpPr>
-      <p:graphicFrame>
-        <p:nvGraphicFramePr>
-          <p:cNvPr id="2" name="Table 1"/>
-          <p:cNvGraphicFramePr>
-            <a:graphicFrameLocks noGrp="1"/>
-          </p:cNvGraphicFramePr>
-          <p:nvPr/>
-        </p:nvGraphicFramePr>
-        <p:xfrm>
-          <a:off x="457200" y="761999"/>
-          <a:ext cx="8305800" cy="5770880"/>
-        </p:xfrm>
-        <a:graphic>
-          <a:graphicData uri="http://schemas.openxmlformats.org/drawingml/2006/table">
-            <a:tbl>
-              <a:tblPr firstRow="1" bandRow="1">
-                <a:tableStyleId>{5C22544A-7EE6-4342-B048-85BDC9FD1C3A}</a:tableStyleId>
-              </a:tblPr>
-              <a:tblGrid>
-                <a:gridCol w="2076450"/>
-                <a:gridCol w="2076450"/>
-                <a:gridCol w="2076450"/>
-                <a:gridCol w="2076450"/>
-              </a:tblGrid>
-              <a:tr h="1879600">
-                <a:tc>
-                  <a:txBody>
-                    <a:bodyPr/>
-                    <a:lstStyle/>
-                    <a:p>
-                      <a:r>
-                        <a:rPr lang="en-US" dirty="0" smtClean="0"/>
-                        <a:t>   MACRO –MARKET</a:t>
-                      </a:r>
-                    </a:p>
-                    <a:p>
-                      <a:r>
-                        <a:rPr lang="en-US" dirty="0" smtClean="0"/>
-                        <a:t>   DISCOVERING</a:t>
-                      </a:r>
-                      <a:endParaRPr lang="en-US" dirty="0"/>
-                    </a:p>
-                  </a:txBody>
-                  <a:tcPr/>
-                </a:tc>
-                <a:tc>
-                  <a:txBody>
-                    <a:bodyPr/>
-                    <a:lstStyle/>
-                    <a:p>
-                      <a:r>
-                        <a:rPr lang="en-US" dirty="0" smtClean="0"/>
-                        <a:t>     CONNECT</a:t>
-                      </a:r>
-                      <a:endParaRPr lang="en-US" dirty="0"/>
-                    </a:p>
-                  </a:txBody>
-                  <a:tcPr/>
-                </a:tc>
-                <a:tc>
-                  <a:txBody>
-                    <a:bodyPr/>
-                    <a:lstStyle/>
-                    <a:p>
-                      <a:r>
-                        <a:rPr lang="en-US" dirty="0" smtClean="0"/>
-                        <a:t>    ENABLE</a:t>
-                      </a:r>
-                      <a:endParaRPr lang="en-US" dirty="0"/>
-                    </a:p>
-                  </a:txBody>
-                  <a:tcPr/>
-                </a:tc>
-                <a:tc>
-                  <a:txBody>
-                    <a:bodyPr/>
-                    <a:lstStyle/>
-                    <a:p>
-                      <a:r>
-                        <a:rPr lang="en-US" dirty="0" smtClean="0"/>
-                        <a:t>    NURTURE</a:t>
-                      </a:r>
-                      <a:endParaRPr lang="en-US" dirty="0"/>
-                    </a:p>
-                  </a:txBody>
-                  <a:tcPr/>
-                </a:tc>
-              </a:tr>
-              <a:tr h="1879600">
-                <a:tc>
-                  <a:txBody>
-                    <a:bodyPr/>
-                    <a:lstStyle/>
-                    <a:p>
-                      <a:r>
-                        <a:rPr lang="en-US" dirty="0" smtClean="0"/>
-                        <a:t>Creating</a:t>
-                      </a:r>
-                      <a:r>
-                        <a:rPr lang="en-US" baseline="0" dirty="0" smtClean="0"/>
-                        <a:t> the demand for goods and services . creating environment friendly packaging.</a:t>
-                      </a:r>
-                    </a:p>
-                    <a:p>
-                      <a:r>
-                        <a:rPr lang="en-US" baseline="0" dirty="0" smtClean="0"/>
-                        <a:t> </a:t>
-                      </a:r>
-                      <a:endParaRPr lang="en-US" dirty="0"/>
-                    </a:p>
-                  </a:txBody>
-                  <a:tcPr/>
-                </a:tc>
-                <a:tc>
-                  <a:txBody>
-                    <a:bodyPr/>
-                    <a:lstStyle/>
-                    <a:p>
-                      <a:r>
-                        <a:rPr lang="en-US" dirty="0" smtClean="0"/>
-                        <a:t>To</a:t>
-                      </a:r>
-                      <a:r>
-                        <a:rPr lang="en-US" baseline="0" dirty="0" smtClean="0"/>
-                        <a:t> connect with gesture community.</a:t>
-                      </a:r>
-                      <a:endParaRPr lang="en-US" dirty="0"/>
-                    </a:p>
-                  </a:txBody>
-                  <a:tcPr/>
-                </a:tc>
-                <a:tc>
-                  <a:txBody>
-                    <a:bodyPr/>
-                    <a:lstStyle/>
-                    <a:p>
-                      <a:r>
-                        <a:rPr lang="en-US" dirty="0" smtClean="0"/>
-                        <a:t>Business to take place between stakeholder and customer</a:t>
-                      </a:r>
-                      <a:r>
-                        <a:rPr lang="en-US" baseline="0" dirty="0" smtClean="0"/>
-                        <a:t> we need to enable set of services</a:t>
-                      </a:r>
-                      <a:endParaRPr lang="en-US" dirty="0" smtClean="0"/>
-                    </a:p>
-                  </a:txBody>
-                  <a:tcPr/>
-                </a:tc>
-                <a:tc>
-                  <a:txBody>
-                    <a:bodyPr/>
-                    <a:lstStyle/>
-                    <a:p>
-                      <a:r>
-                        <a:rPr lang="en-US" dirty="0" smtClean="0"/>
-                        <a:t>Disputes</a:t>
-                      </a:r>
-                      <a:r>
-                        <a:rPr lang="en-US" baseline="0" dirty="0" smtClean="0"/>
-                        <a:t>  ,problems faced by the customers.</a:t>
-                      </a:r>
-                    </a:p>
-                    <a:p>
-                      <a:r>
-                        <a:rPr lang="en-US" baseline="0" dirty="0" smtClean="0"/>
-                        <a:t>Notifications regarding the offers available</a:t>
-                      </a:r>
-                      <a:endParaRPr lang="en-US" dirty="0"/>
-                    </a:p>
-                  </a:txBody>
-                  <a:tcPr/>
-                </a:tc>
-              </a:tr>
-              <a:tr h="1879600">
-                <a:tc>
-                  <a:txBody>
-                    <a:bodyPr/>
-                    <a:lstStyle/>
-                    <a:p>
-                      <a:r>
-                        <a:rPr lang="en-US" dirty="0" smtClean="0"/>
-                        <a:t>Creating advertising campaigns that emphasizes how</a:t>
-                      </a:r>
-                      <a:r>
-                        <a:rPr lang="en-US" baseline="0" dirty="0" smtClean="0"/>
-                        <a:t> a</a:t>
-                      </a:r>
-                      <a:r>
-                        <a:rPr lang="en-US" dirty="0" smtClean="0"/>
-                        <a:t> product or service meets the wants of the society overall.</a:t>
-                      </a:r>
-                      <a:endParaRPr lang="en-US" dirty="0"/>
-                    </a:p>
-                  </a:txBody>
-                  <a:tcPr/>
-                </a:tc>
-                <a:tc>
-                  <a:txBody>
-                    <a:bodyPr/>
-                    <a:lstStyle/>
-                    <a:p>
-                      <a:endParaRPr lang="en-US" dirty="0"/>
-                    </a:p>
-                  </a:txBody>
-                  <a:tcPr/>
-                </a:tc>
-                <a:tc>
-                  <a:txBody>
-                    <a:bodyPr/>
-                    <a:lstStyle/>
-                    <a:p>
-                      <a:endParaRPr lang="en-US" dirty="0"/>
-                    </a:p>
-                  </a:txBody>
-                  <a:tcPr/>
-                </a:tc>
-                <a:tc>
-                  <a:txBody>
-                    <a:bodyPr/>
-                    <a:lstStyle/>
-                    <a:p>
-                      <a:endParaRPr lang="en-US" dirty="0"/>
-                    </a:p>
-                  </a:txBody>
-                  <a:tcPr/>
-                </a:tc>
-              </a:tr>
-            </a:tbl>
-          </a:graphicData>
-        </a:graphic>
-      </p:graphicFrame>
-      <p:sp>
-        <p:nvSpPr>
-          <p:cNvPr id="3" name="TextBox 2"/>
-          <p:cNvSpPr txBox="1"/>
-          <p:nvPr/>
-        </p:nvSpPr>
-        <p:spPr>
-          <a:xfrm>
-            <a:off x="2819400" y="152400"/>
-            <a:ext cx="4195379" cy="523220"/>
-          </a:xfrm>
-          <a:prstGeom prst="rect">
-            <a:avLst/>
-          </a:prstGeom>
-          <a:noFill/>
-        </p:spPr>
-        <p:txBody>
-          <a:bodyPr wrap="square" rtlCol="0">
-            <a:spAutoFit/>
-          </a:bodyPr>
-          <a:lstStyle/>
-          <a:p>
-            <a:r>
-              <a:rPr lang="en-US" sz="2800" dirty="0" smtClean="0">
-                <a:latin typeface="Algerian" pitchFamily="82" charset="0"/>
-              </a:rPr>
-              <a:t>DEVELOPMENT PROCESS</a:t>
-            </a:r>
-            <a:endParaRPr lang="en-US" sz="2800" dirty="0">
-              <a:latin typeface="Algerian" pitchFamily="82" charset="0"/>
-            </a:endParaRPr>
-          </a:p>
-        </p:txBody>
-      </p:sp>
-    </p:spTree>
-  </p:cSld>
-  <p:clrMapOvr>
-    <a:masterClrMapping/>
-  </p:clrMapOvr>
-</p:sld>
-</file>
-
-<file path=ppt/slides/slide7.xml><?xml version="1.0" encoding="utf-8"?>
-<p:sld xmlns:a="http://schemas.openxmlformats.org/drawingml/2006/main" xmlns:r="http://schemas.openxmlformats.org/officeDocument/2006/relationships" xmlns:p="http://schemas.openxmlformats.org/presentationml/2006/main">
-  <p:cSld>
-    <p:spTree>
-      <p:nvGrpSpPr>
-        <p:cNvPr id="1" name=""/>
-        <p:cNvGrpSpPr/>
-        <p:nvPr/>
-      </p:nvGrpSpPr>
-      <p:grpSpPr>
-        <a:xfrm>
-          <a:off x="0" y="0"/>
-          <a:ext cx="0" cy="0"/>
-          <a:chOff x="0" y="0"/>
-          <a:chExt cx="0" cy="0"/>
-        </a:xfrm>
-      </p:grpSpPr>
-      <p:sp>
-        <p:nvSpPr>
-          <p:cNvPr id="2" name="TextBox 1"/>
-          <p:cNvSpPr txBox="1"/>
-          <p:nvPr/>
-        </p:nvSpPr>
-        <p:spPr>
-          <a:xfrm>
-            <a:off x="3657600" y="228600"/>
-            <a:ext cx="1905000" cy="707886"/>
-          </a:xfrm>
-          <a:prstGeom prst="rect">
-            <a:avLst/>
-          </a:prstGeom>
-          <a:noFill/>
-        </p:spPr>
-        <p:txBody>
-          <a:bodyPr wrap="square" rtlCol="0">
-            <a:spAutoFit/>
-          </a:bodyPr>
-          <a:lstStyle/>
-          <a:p>
-            <a:r>
-              <a:rPr lang="en-US" sz="4000" dirty="0" smtClean="0">
-                <a:latin typeface="Algerian" pitchFamily="82" charset="0"/>
-              </a:rPr>
-              <a:t>USERS</a:t>
-            </a:r>
-            <a:endParaRPr lang="en-US" sz="4000" dirty="0">
-              <a:latin typeface="Algerian" pitchFamily="82" charset="0"/>
-            </a:endParaRPr>
-          </a:p>
-        </p:txBody>
-      </p:sp>
-      <p:sp>
-        <p:nvSpPr>
-          <p:cNvPr id="3" name="TextBox 2"/>
-          <p:cNvSpPr txBox="1"/>
-          <p:nvPr/>
-        </p:nvSpPr>
-        <p:spPr>
-          <a:xfrm>
-            <a:off x="1143000" y="762000"/>
-            <a:ext cx="7391400" cy="6447177"/>
-          </a:xfrm>
-          <a:prstGeom prst="rect">
-            <a:avLst/>
-          </a:prstGeom>
-          <a:noFill/>
-        </p:spPr>
-        <p:txBody>
-          <a:bodyPr wrap="square" rtlCol="0">
-            <a:spAutoFit/>
-          </a:bodyPr>
-          <a:lstStyle/>
-          <a:p>
-            <a:pPr>
-              <a:lnSpc>
-                <a:spcPct val="150000"/>
-              </a:lnSpc>
-              <a:buFont typeface="Wingdings" pitchFamily="2" charset="2"/>
-              <a:buChar char="Ø"/>
-            </a:pPr>
-            <a:r>
-              <a:rPr lang="en-US" sz="2400" dirty="0" err="1" smtClean="0"/>
-              <a:t>Laundary</a:t>
-            </a:r>
-            <a:r>
-              <a:rPr lang="en-US" sz="2400" dirty="0" smtClean="0"/>
-              <a:t>:- Everyone( all the 3000 people under the gesture company)</a:t>
-            </a:r>
-          </a:p>
-          <a:p>
-            <a:pPr>
-              <a:lnSpc>
-                <a:spcPct val="150000"/>
-              </a:lnSpc>
-              <a:buFont typeface="Wingdings" pitchFamily="2" charset="2"/>
-              <a:buChar char="Ø"/>
-            </a:pPr>
-            <a:r>
-              <a:rPr lang="en-US" sz="2400" dirty="0" smtClean="0"/>
-              <a:t>Vegetable seller:-Everyone</a:t>
-            </a:r>
-          </a:p>
-          <a:p>
-            <a:pPr>
-              <a:lnSpc>
-                <a:spcPct val="150000"/>
-              </a:lnSpc>
-              <a:buFont typeface="Wingdings" pitchFamily="2" charset="2"/>
-              <a:buChar char="Ø"/>
-            </a:pPr>
-            <a:r>
-              <a:rPr lang="en-US" sz="2400" dirty="0" smtClean="0"/>
-              <a:t>Tea shop:-Everyone</a:t>
-            </a:r>
-          </a:p>
-          <a:p>
-            <a:pPr>
-              <a:lnSpc>
-                <a:spcPct val="150000"/>
-              </a:lnSpc>
-              <a:buFont typeface="Wingdings" pitchFamily="2" charset="2"/>
-              <a:buChar char="Ø"/>
-            </a:pPr>
-            <a:r>
-              <a:rPr lang="en-US" sz="2400" dirty="0" smtClean="0"/>
-              <a:t>Chat center:-  employees</a:t>
-            </a:r>
-          </a:p>
-          <a:p>
-            <a:pPr>
-              <a:lnSpc>
-                <a:spcPct val="150000"/>
-              </a:lnSpc>
-              <a:buFont typeface="Wingdings" pitchFamily="2" charset="2"/>
-              <a:buChar char="Ø"/>
-            </a:pPr>
-            <a:r>
-              <a:rPr lang="en-US" sz="2400" dirty="0" smtClean="0"/>
-              <a:t>Tailor:-Everyone</a:t>
-            </a:r>
-          </a:p>
-          <a:p>
-            <a:pPr>
-              <a:lnSpc>
-                <a:spcPct val="150000"/>
-              </a:lnSpc>
-              <a:buFont typeface="Wingdings" pitchFamily="2" charset="2"/>
-              <a:buChar char="Ø"/>
-            </a:pPr>
-            <a:r>
-              <a:rPr lang="en-US" sz="2400" dirty="0" smtClean="0"/>
-              <a:t>Auto:-Employee</a:t>
-            </a:r>
-          </a:p>
-          <a:p>
-            <a:pPr>
-              <a:lnSpc>
-                <a:spcPct val="150000"/>
-              </a:lnSpc>
-              <a:buFont typeface="Wingdings" pitchFamily="2" charset="2"/>
-              <a:buChar char="Ø"/>
-            </a:pPr>
-            <a:r>
-              <a:rPr lang="en-US" sz="2400" dirty="0" smtClean="0"/>
-              <a:t>Dairy:-Everyone</a:t>
-            </a:r>
-          </a:p>
-          <a:p>
-            <a:pPr>
-              <a:lnSpc>
-                <a:spcPct val="150000"/>
-              </a:lnSpc>
-              <a:buFont typeface="Wingdings" pitchFamily="2" charset="2"/>
-              <a:buChar char="Ø"/>
-            </a:pPr>
-            <a:r>
-              <a:rPr lang="en-US" sz="2400" dirty="0" smtClean="0"/>
-              <a:t>Tender coconut seller:-Employees</a:t>
-            </a:r>
-          </a:p>
-          <a:p>
-            <a:pPr>
-              <a:lnSpc>
-                <a:spcPct val="150000"/>
-              </a:lnSpc>
-              <a:buFont typeface="Wingdings" pitchFamily="2" charset="2"/>
-              <a:buChar char="Ø"/>
-            </a:pPr>
-            <a:r>
-              <a:rPr lang="en-US" sz="2400" dirty="0" smtClean="0"/>
-              <a:t>Sapling store:-Employees</a:t>
-            </a:r>
-          </a:p>
-          <a:p>
-            <a:endParaRPr lang="en-US" sz="2400" dirty="0" smtClean="0"/>
-          </a:p>
-          <a:p>
-            <a:pPr>
-              <a:buFont typeface="Wingdings" pitchFamily="2" charset="2"/>
-              <a:buChar char="Ø"/>
-            </a:pPr>
-            <a:endParaRPr lang="en-US" sz="2400" dirty="0"/>
-          </a:p>
-        </p:txBody>
-      </p:sp>
-    </p:spTree>
-  </p:cSld>
-  <p:clrMapOvr>
-    <a:masterClrMapping/>
-  </p:clrMapOvr>
-</p:sld>
-</file>
-
-<file path=ppt/slides/slide8.xml><?xml version="1.0" encoding="utf-8"?>
-<p:sld xmlns:a="http://schemas.openxmlformats.org/drawingml/2006/main" xmlns:r="http://schemas.openxmlformats.org/officeDocument/2006/relationships" xmlns:p="http://schemas.openxmlformats.org/presentationml/2006/main">
-  <p:cSld>
-    <p:spTree>
-      <p:nvGrpSpPr>
-        <p:cNvPr id="1" name=""/>
-        <p:cNvGrpSpPr/>
-        <p:nvPr/>
-      </p:nvGrpSpPr>
-      <p:grpSpPr>
-        <a:xfrm>
-          <a:off x="0" y="0"/>
-          <a:ext cx="0" cy="0"/>
-          <a:chOff x="0" y="0"/>
-          <a:chExt cx="0" cy="0"/>
-        </a:xfrm>
-      </p:grpSpPr>
-      <p:sp>
-        <p:nvSpPr>
-          <p:cNvPr id="2" name="TextBox 1"/>
-          <p:cNvSpPr txBox="1"/>
-          <p:nvPr/>
-        </p:nvSpPr>
-        <p:spPr>
-          <a:xfrm>
-            <a:off x="2362200" y="228600"/>
-            <a:ext cx="4953000" cy="584775"/>
-          </a:xfrm>
-          <a:prstGeom prst="rect">
-            <a:avLst/>
-          </a:prstGeom>
-          <a:noFill/>
-        </p:spPr>
-        <p:txBody>
-          <a:bodyPr wrap="square" rtlCol="0">
-            <a:spAutoFit/>
-          </a:bodyPr>
-          <a:lstStyle/>
-          <a:p>
-            <a:r>
-              <a:rPr lang="en-US" sz="3200" dirty="0" smtClean="0">
-                <a:latin typeface="Algerian" pitchFamily="82" charset="0"/>
-              </a:rPr>
-              <a:t>CUSTOMER REQUISITION</a:t>
-            </a:r>
-            <a:endParaRPr lang="en-US" sz="3200" dirty="0">
-              <a:latin typeface="Algerian" pitchFamily="82" charset="0"/>
-            </a:endParaRPr>
-          </a:p>
-        </p:txBody>
-      </p:sp>
-      <p:sp>
-        <p:nvSpPr>
-          <p:cNvPr id="4" name="TextBox 3"/>
-          <p:cNvSpPr txBox="1"/>
-          <p:nvPr/>
-        </p:nvSpPr>
-        <p:spPr>
-          <a:xfrm>
-            <a:off x="152401" y="1295400"/>
-            <a:ext cx="8839200" cy="4801314"/>
-          </a:xfrm>
-          <a:prstGeom prst="rect">
-            <a:avLst/>
-          </a:prstGeom>
-          <a:noFill/>
-        </p:spPr>
-        <p:txBody>
-          <a:bodyPr wrap="square" rtlCol="0">
-            <a:spAutoFit/>
-          </a:bodyPr>
-          <a:lstStyle/>
-          <a:p>
-            <a:pPr>
-              <a:lnSpc>
-                <a:spcPct val="150000"/>
-              </a:lnSpc>
-              <a:buFont typeface="Wingdings" pitchFamily="2" charset="2"/>
-              <a:buChar char="Ø"/>
-            </a:pPr>
-            <a:r>
-              <a:rPr lang="en-US" sz="2400" dirty="0" smtClean="0"/>
-              <a:t>To learn whether the customers are satisfied with all  the services provided to them and can request for the services from the company.</a:t>
-            </a:r>
-          </a:p>
-          <a:p>
-            <a:pPr>
-              <a:lnSpc>
-                <a:spcPct val="150000"/>
-              </a:lnSpc>
-              <a:buFont typeface="Wingdings" pitchFamily="2" charset="2"/>
-              <a:buChar char="Ø"/>
-            </a:pPr>
-            <a:r>
-              <a:rPr lang="en-US" sz="2400" dirty="0" smtClean="0"/>
-              <a:t>Customers can convey feedback regarding any issues with customer requirement.</a:t>
-            </a:r>
-          </a:p>
-          <a:p>
-            <a:pPr>
-              <a:lnSpc>
-                <a:spcPct val="150000"/>
-              </a:lnSpc>
-              <a:buFont typeface="Wingdings" pitchFamily="2" charset="2"/>
-              <a:buChar char="Ø"/>
-            </a:pPr>
-            <a:r>
-              <a:rPr lang="en-US" sz="2400" dirty="0" smtClean="0"/>
-              <a:t>When customer demands for products or services, if they are not satisfied with that product or  service  they can   give negative feedback.</a:t>
-            </a:r>
-          </a:p>
-          <a:p>
-            <a:pPr>
-              <a:lnSpc>
-                <a:spcPct val="150000"/>
-              </a:lnSpc>
-            </a:pPr>
-            <a:endParaRPr lang="en-US" sz="2400" dirty="0" smtClean="0"/>
-          </a:p>
-          <a:p>
-            <a:pPr>
-              <a:buFont typeface="Wingdings" pitchFamily="2" charset="2"/>
-              <a:buChar char="Ø"/>
-            </a:pPr>
-            <a:endParaRPr lang="en-US" dirty="0"/>
-          </a:p>
-        </p:txBody>
-      </p:sp>
-    </p:spTree>
-  </p:cSld>
-  <p:clrMapOvr>
-    <a:masterClrMapping/>
-  </p:clrMapOvr>
-</p:sld>
-</file>
-
-<file path=ppt/slides/slide9.xml><?xml version="1.0" encoding="utf-8"?>
 <p:sld xmlns:a="http://schemas.openxmlformats.org/drawingml/2006/main" xmlns:r="http://schemas.openxmlformats.org/officeDocument/2006/relationships" xmlns:p="http://schemas.openxmlformats.org/presentationml/2006/main">
   <p:cSld>
     <p:spTree>
@@ -4624,4 +4566,287 @@
   <a:objectDefaults/>
   <a:extraClrSchemeLst/>
 </a:theme>
+</file>
+
+<file path=ppt/theme/theme2.xml><?xml version="1.0" encoding="utf-8"?>
+<a:theme xmlns:a="http://schemas.openxmlformats.org/drawingml/2006/main" name="Office Theme">
+  <a:themeElements>
+    <a:clrScheme name="Office">
+      <a:dk1>
+        <a:sysClr val="windowText" lastClr="000000"/>
+      </a:dk1>
+      <a:lt1>
+        <a:sysClr val="window" lastClr="FFFFFF"/>
+      </a:lt1>
+      <a:dk2>
+        <a:srgbClr val="1F497D"/>
+      </a:dk2>
+      <a:lt2>
+        <a:srgbClr val="EEECE1"/>
+      </a:lt2>
+      <a:accent1>
+        <a:srgbClr val="4F81BD"/>
+      </a:accent1>
+      <a:accent2>
+        <a:srgbClr val="C0504D"/>
+      </a:accent2>
+      <a:accent3>
+        <a:srgbClr val="9BBB59"/>
+      </a:accent3>
+      <a:accent4>
+        <a:srgbClr val="8064A2"/>
+      </a:accent4>
+      <a:accent5>
+        <a:srgbClr val="4BACC6"/>
+      </a:accent5>
+      <a:accent6>
+        <a:srgbClr val="F79646"/>
+      </a:accent6>
+      <a:hlink>
+        <a:srgbClr val="0000FF"/>
+      </a:hlink>
+      <a:folHlink>
+        <a:srgbClr val="800080"/>
+      </a:folHlink>
+    </a:clrScheme>
+    <a:fontScheme name="Office">
+      <a:majorFont>
+        <a:latin typeface="Calibri"/>
+        <a:ea typeface=""/>
+        <a:cs typeface=""/>
+        <a:font script="Jpan" typeface="ＭＳ Ｐゴシック"/>
+        <a:font script="Hang" typeface="맑은 고딕"/>
+        <a:font script="Hans" typeface="宋体"/>
+        <a:font script="Hant" typeface="新細明體"/>
+        <a:font script="Arab" typeface="Times New Roman"/>
+        <a:font script="Hebr" typeface="Times New Roman"/>
+        <a:font script="Thai" typeface="Angsana New"/>
+        <a:font script="Ethi" typeface="Nyala"/>
+        <a:font script="Beng" typeface="Vrinda"/>
+        <a:font script="Gujr" typeface="Shruti"/>
+        <a:font script="Khmr" typeface="MoolBoran"/>
+        <a:font script="Knda" typeface="Tunga"/>
+        <a:font script="Guru" typeface="Raavi"/>
+        <a:font script="Cans" typeface="Euphemia"/>
+        <a:font script="Cher" typeface="Plantagenet Cherokee"/>
+        <a:font script="Yiii" typeface="Microsoft Yi Baiti"/>
+        <a:font script="Tibt" typeface="Microsoft Himalaya"/>
+        <a:font script="Thaa" typeface="MV Boli"/>
+        <a:font script="Deva" typeface="Mangal"/>
+        <a:font script="Telu" typeface="Gautami"/>
+        <a:font script="Taml" typeface="Latha"/>
+        <a:font script="Syrc" typeface="Estrangelo Edessa"/>
+        <a:font script="Orya" typeface="Kalinga"/>
+        <a:font script="Mlym" typeface="Kartika"/>
+        <a:font script="Laoo" typeface="DokChampa"/>
+        <a:font script="Sinh" typeface="Iskoola Pota"/>
+        <a:font script="Mong" typeface="Mongolian Baiti"/>
+        <a:font script="Viet" typeface="Times New Roman"/>
+        <a:font script="Uigh" typeface="Microsoft Uighur"/>
+      </a:majorFont>
+      <a:minorFont>
+        <a:latin typeface="Calibri"/>
+        <a:ea typeface=""/>
+        <a:cs typeface=""/>
+        <a:font script="Jpan" typeface="ＭＳ Ｐゴシック"/>
+        <a:font script="Hang" typeface="맑은 고딕"/>
+        <a:font script="Hans" typeface="宋体"/>
+        <a:font script="Hant" typeface="新細明體"/>
+        <a:font script="Arab" typeface="Arial"/>
+        <a:font script="Hebr" typeface="Arial"/>
+        <a:font script="Thai" typeface="Cordia New"/>
+        <a:font script="Ethi" typeface="Nyala"/>
+        <a:font script="Beng" typeface="Vrinda"/>
+        <a:font script="Gujr" typeface="Shruti"/>
+        <a:font script="Khmr" typeface="DaunPenh"/>
+        <a:font script="Knda" typeface="Tunga"/>
+        <a:font script="Guru" typeface="Raavi"/>
+        <a:font script="Cans" typeface="Euphemia"/>
+        <a:font script="Cher" typeface="Plantagenet Cherokee"/>
+        <a:font script="Yiii" typeface="Microsoft Yi Baiti"/>
+        <a:font script="Tibt" typeface="Microsoft Himalaya"/>
+        <a:font script="Thaa" typeface="MV Boli"/>
+        <a:font script="Deva" typeface="Mangal"/>
+        <a:font script="Telu" typeface="Gautami"/>
+        <a:font script="Taml" typeface="Latha"/>
+        <a:font script="Syrc" typeface="Estrangelo Edessa"/>
+        <a:font script="Orya" typeface="Kalinga"/>
+        <a:font script="Mlym" typeface="Kartika"/>
+        <a:font script="Laoo" typeface="DokChampa"/>
+        <a:font script="Sinh" typeface="Iskoola Pota"/>
+        <a:font script="Mong" typeface="Mongolian Baiti"/>
+        <a:font script="Viet" typeface="Arial"/>
+        <a:font script="Uigh" typeface="Microsoft Uighur"/>
+      </a:minorFont>
+    </a:fontScheme>
+    <a:fmtScheme name="Office">
+      <a:fillStyleLst>
+        <a:solidFill>
+          <a:schemeClr val="phClr"/>
+        </a:solidFill>
+        <a:gradFill rotWithShape="1">
+          <a:gsLst>
+            <a:gs pos="0">
+              <a:schemeClr val="phClr">
+                <a:tint val="50000"/>
+                <a:satMod val="300000"/>
+              </a:schemeClr>
+            </a:gs>
+            <a:gs pos="35000">
+              <a:schemeClr val="phClr">
+                <a:tint val="37000"/>
+                <a:satMod val="300000"/>
+              </a:schemeClr>
+            </a:gs>
+            <a:gs pos="100000">
+              <a:schemeClr val="phClr">
+                <a:tint val="15000"/>
+                <a:satMod val="350000"/>
+              </a:schemeClr>
+            </a:gs>
+          </a:gsLst>
+          <a:lin ang="16200000" scaled="1"/>
+        </a:gradFill>
+        <a:gradFill rotWithShape="1">
+          <a:gsLst>
+            <a:gs pos="0">
+              <a:schemeClr val="phClr">
+                <a:shade val="51000"/>
+                <a:satMod val="130000"/>
+              </a:schemeClr>
+            </a:gs>
+            <a:gs pos="80000">
+              <a:schemeClr val="phClr">
+                <a:shade val="93000"/>
+                <a:satMod val="130000"/>
+              </a:schemeClr>
+            </a:gs>
+            <a:gs pos="100000">
+              <a:schemeClr val="phClr">
+                <a:shade val="94000"/>
+                <a:satMod val="135000"/>
+              </a:schemeClr>
+            </a:gs>
+          </a:gsLst>
+          <a:lin ang="16200000" scaled="0"/>
+        </a:gradFill>
+      </a:fillStyleLst>
+      <a:lnStyleLst>
+        <a:ln w="9525" cap="flat" cmpd="sng" algn="ctr">
+          <a:solidFill>
+            <a:schemeClr val="phClr">
+              <a:shade val="95000"/>
+              <a:satMod val="105000"/>
+            </a:schemeClr>
+          </a:solidFill>
+          <a:prstDash val="solid"/>
+        </a:ln>
+        <a:ln w="25400" cap="flat" cmpd="sng" algn="ctr">
+          <a:solidFill>
+            <a:schemeClr val="phClr"/>
+          </a:solidFill>
+          <a:prstDash val="solid"/>
+        </a:ln>
+        <a:ln w="38100" cap="flat" cmpd="sng" algn="ctr">
+          <a:solidFill>
+            <a:schemeClr val="phClr"/>
+          </a:solidFill>
+          <a:prstDash val="solid"/>
+        </a:ln>
+      </a:lnStyleLst>
+      <a:effectStyleLst>
+        <a:effectStyle>
+          <a:effectLst>
+            <a:outerShdw blurRad="40000" dist="20000" dir="5400000" rotWithShape="0">
+              <a:srgbClr val="000000">
+                <a:alpha val="38000"/>
+              </a:srgbClr>
+            </a:outerShdw>
+          </a:effectLst>
+        </a:effectStyle>
+        <a:effectStyle>
+          <a:effectLst>
+            <a:outerShdw blurRad="40000" dist="23000" dir="5400000" rotWithShape="0">
+              <a:srgbClr val="000000">
+                <a:alpha val="35000"/>
+              </a:srgbClr>
+            </a:outerShdw>
+          </a:effectLst>
+        </a:effectStyle>
+        <a:effectStyle>
+          <a:effectLst>
+            <a:outerShdw blurRad="40000" dist="23000" dir="5400000" rotWithShape="0">
+              <a:srgbClr val="000000">
+                <a:alpha val="35000"/>
+              </a:srgbClr>
+            </a:outerShdw>
+          </a:effectLst>
+          <a:scene3d>
+            <a:camera prst="orthographicFront">
+              <a:rot lat="0" lon="0" rev="0"/>
+            </a:camera>
+            <a:lightRig rig="threePt" dir="t">
+              <a:rot lat="0" lon="0" rev="1200000"/>
+            </a:lightRig>
+          </a:scene3d>
+          <a:sp3d>
+            <a:bevelT w="63500" h="25400"/>
+          </a:sp3d>
+        </a:effectStyle>
+      </a:effectStyleLst>
+      <a:bgFillStyleLst>
+        <a:solidFill>
+          <a:schemeClr val="phClr"/>
+        </a:solidFill>
+        <a:gradFill rotWithShape="1">
+          <a:gsLst>
+            <a:gs pos="0">
+              <a:schemeClr val="phClr">
+                <a:tint val="40000"/>
+                <a:satMod val="350000"/>
+              </a:schemeClr>
+            </a:gs>
+            <a:gs pos="40000">
+              <a:schemeClr val="phClr">
+                <a:tint val="45000"/>
+                <a:shade val="99000"/>
+                <a:satMod val="350000"/>
+              </a:schemeClr>
+            </a:gs>
+            <a:gs pos="100000">
+              <a:schemeClr val="phClr">
+                <a:shade val="20000"/>
+                <a:satMod val="255000"/>
+              </a:schemeClr>
+            </a:gs>
+          </a:gsLst>
+          <a:path path="circle">
+            <a:fillToRect l="50000" t="-80000" r="50000" b="180000"/>
+          </a:path>
+        </a:gradFill>
+        <a:gradFill rotWithShape="1">
+          <a:gsLst>
+            <a:gs pos="0">
+              <a:schemeClr val="phClr">
+                <a:tint val="80000"/>
+                <a:satMod val="300000"/>
+              </a:schemeClr>
+            </a:gs>
+            <a:gs pos="100000">
+              <a:schemeClr val="phClr">
+                <a:shade val="30000"/>
+                <a:satMod val="200000"/>
+              </a:schemeClr>
+            </a:gs>
+          </a:gsLst>
+          <a:path path="circle">
+            <a:fillToRect l="50000" t="50000" r="50000" b="50000"/>
+          </a:path>
+        </a:gradFill>
+      </a:bgFillStyleLst>
+    </a:fmtScheme>
+  </a:themeElements>
+  <a:objectDefaults/>
+  <a:extraClrSchemeLst/>
+</a:theme>
 </file>
</xml_diff>